<commit_message>
small changes to my update slide
</commit_message>
<xml_diff>
--- a/weekly-meetings/2016-07-22.pptx
+++ b/weekly-meetings/2016-07-22.pptx
@@ -3178,32 +3178,79 @@
           <a:p>
             <a:r>
               <a:rPr lang="en-US" dirty="0" smtClean="0"/>
-              <a:t>ZFP transformation being tested for upcoming ADIOS release</a:t>
-            </a:r>
-          </a:p>
-          <a:p>
+              <a:t>ZFP transformation being tested for upcoming ADIOS </a:t>
+            </a:r>
+            <a:r>
+              <a:rPr lang="en-US" dirty="0" smtClean="0"/>
+              <a:t>release</a:t>
+            </a:r>
             <a:endParaRPr lang="en-US" dirty="0" smtClean="0"/>
           </a:p>
           <a:p>
             <a:r>
               <a:rPr lang="en-US" dirty="0" smtClean="0"/>
-              <a:t>Working on compression benchmarking software (test many datasets, various methods):</a:t>
-            </a:r>
-            <a:endParaRPr lang="en-US" dirty="0"/>
+              <a:t>Preliminary work on </a:t>
+            </a:r>
+            <a:r>
+              <a:rPr lang="en-US" dirty="0" smtClean="0"/>
+              <a:t>compression </a:t>
+            </a:r>
+            <a:r>
+              <a:rPr lang="en-US" dirty="0" smtClean="0"/>
+              <a:t>benchmarking/error </a:t>
+            </a:r>
+            <a:r>
+              <a:rPr lang="en-US" dirty="0" smtClean="0"/>
+              <a:t>software (test many datasets, various methods</a:t>
+            </a:r>
+            <a:r>
+              <a:rPr lang="en-US" dirty="0" smtClean="0"/>
+              <a:t>)</a:t>
+            </a:r>
+          </a:p>
+          <a:p>
+            <a:r>
+              <a:rPr lang="en-US" dirty="0" smtClean="0"/>
+              <a:t>Example: simple </a:t>
+            </a:r>
+            <a:r>
+              <a:rPr lang="en-US" dirty="0" err="1" smtClean="0"/>
+              <a:t>skel</a:t>
+            </a:r>
+            <a:r>
+              <a:rPr lang="en-US" dirty="0" smtClean="0"/>
+              <a:t> </a:t>
+            </a:r>
+            <a:r>
+              <a:rPr lang="en-US" dirty="0" smtClean="0"/>
+              <a:t>tests with ZFP on </a:t>
+            </a:r>
+            <a:r>
+              <a:rPr lang="en-US" dirty="0" smtClean="0"/>
+              <a:t>~</a:t>
+            </a:r>
+            <a:r>
+              <a:rPr lang="en-US" dirty="0"/>
+              <a:t>10 </a:t>
+            </a:r>
+            <a:r>
+              <a:rPr lang="en-US" dirty="0" smtClean="0"/>
+              <a:t>GB dataset </a:t>
+            </a:r>
           </a:p>
           <a:p>
             <a:pPr lvl="1"/>
             <a:r>
               <a:rPr lang="en-US" dirty="0" smtClean="0"/>
-              <a:t>Preliminary (crude) tests with ZFP on simple S3D data (</a:t>
-            </a:r>
-            <a:r>
-              <a:rPr lang="en-US" dirty="0"/>
-              <a:t>~10 </a:t>
+              <a:t>~ </a:t>
             </a:r>
             <a:r>
               <a:rPr lang="en-US" dirty="0" smtClean="0"/>
-              <a:t>GB) -- about 50:1 compression ratio for 10</a:t>
+              <a:t>50:1 </a:t>
+            </a:r>
+            <a:r>
+              <a:rPr lang="en-US" dirty="0" smtClean="0"/>
+              <a:t>compression ratio for 10</a:t>
             </a:r>
             <a:r>
               <a:rPr lang="en-US" baseline="30000" dirty="0" smtClean="0"/>
@@ -3211,7 +3258,26 @@
             </a:r>
             <a:r>
               <a:rPr lang="en-US" dirty="0" smtClean="0"/>
-              <a:t> relative precision, factor of 5 faster than writing full dataset</a:t>
+              <a:t> relative </a:t>
+            </a:r>
+            <a:r>
+              <a:rPr lang="en-US" dirty="0" smtClean="0"/>
+              <a:t>precision</a:t>
+            </a:r>
+          </a:p>
+          <a:p>
+            <a:pPr lvl="1"/>
+            <a:r>
+              <a:rPr lang="en-US" dirty="0" smtClean="0"/>
+              <a:t>~ </a:t>
+            </a:r>
+            <a:r>
+              <a:rPr lang="en-US" dirty="0" smtClean="0"/>
+              <a:t>5x </a:t>
+            </a:r>
+            <a:r>
+              <a:rPr lang="en-US" dirty="0" smtClean="0"/>
+              <a:t>faster than writing full dataset</a:t>
             </a:r>
           </a:p>
         </p:txBody>

</xml_diff>